<commit_message>
Added final ppt & updated README with YouTube video link
</commit_message>
<xml_diff>
--- a/3610 Presentation.pptx
+++ b/3610 Presentation.pptx
@@ -21,23 +21,24 @@
     <p:sldId id="266" r:id="rId16"/>
     <p:sldId id="267" r:id="rId17"/>
     <p:sldId id="268" r:id="rId18"/>
+    <p:sldId id="269" r:id="rId19"/>
   </p:sldIdLst>
   <p:sldSz cy="5143500" cx="9144000"/>
   <p:notesSz cx="6858000" cy="9144000"/>
   <p:embeddedFontLst>
     <p:embeddedFont>
       <p:font typeface="Raleway"/>
-      <p:regular r:id="rId19"/>
-      <p:bold r:id="rId20"/>
-      <p:italic r:id="rId21"/>
-      <p:boldItalic r:id="rId22"/>
+      <p:regular r:id="rId20"/>
+      <p:bold r:id="rId21"/>
+      <p:italic r:id="rId22"/>
+      <p:boldItalic r:id="rId23"/>
     </p:embeddedFont>
     <p:embeddedFont>
       <p:font typeface="Lato"/>
-      <p:regular r:id="rId23"/>
-      <p:bold r:id="rId24"/>
-      <p:italic r:id="rId25"/>
-      <p:boldItalic r:id="rId26"/>
+      <p:regular r:id="rId24"/>
+      <p:bold r:id="rId25"/>
+      <p:italic r:id="rId26"/>
+      <p:boldItalic r:id="rId27"/>
     </p:embeddedFont>
   </p:embeddedFontLst>
   <p:defaultTextStyle>
@@ -816,7 +817,7 @@
   <p:cSld>
     <p:spTree>
       <p:nvGrpSpPr>
-        <p:cNvPr id="142" name="Shape 142"/>
+        <p:cNvPr id="145" name="Shape 145"/>
         <p:cNvGrpSpPr/>
         <p:nvPr/>
       </p:nvGrpSpPr>
@@ -830,7 +831,7 @@
       </p:grpSpPr>
       <p:sp>
         <p:nvSpPr>
-          <p:cNvPr id="143" name="Google Shape;143;g50e882c3b4_0_5:notes"/>
+          <p:cNvPr id="146" name="Google Shape;146;g562c6556b6_0_23:notes"/>
           <p:cNvSpPr/>
           <p:nvPr>
             <p:ph idx="2" type="sldImg"/>
@@ -865,7 +866,7 @@
       </p:sp>
       <p:sp>
         <p:nvSpPr>
-          <p:cNvPr id="144" name="Google Shape;144;g50e882c3b4_0_5:notes"/>
+          <p:cNvPr id="147" name="Google Shape;147;g562c6556b6_0_23:notes"/>
           <p:cNvSpPr txBox="1"/>
           <p:nvPr>
             <p:ph idx="1" type="body"/>
@@ -915,7 +916,7 @@
   <p:cSld>
     <p:spTree>
       <p:nvGrpSpPr>
-        <p:cNvPr id="148" name="Shape 148"/>
+        <p:cNvPr id="152" name="Shape 152"/>
         <p:cNvGrpSpPr/>
         <p:nvPr/>
       </p:nvGrpSpPr>
@@ -929,7 +930,7 @@
       </p:grpSpPr>
       <p:sp>
         <p:nvSpPr>
-          <p:cNvPr id="149" name="Google Shape;149;g5623285311_0_5:notes"/>
+          <p:cNvPr id="153" name="Google Shape;153;g50e882c3b4_0_5:notes"/>
           <p:cNvSpPr/>
           <p:nvPr>
             <p:ph idx="2" type="sldImg"/>
@@ -964,7 +965,7 @@
       </p:sp>
       <p:sp>
         <p:nvSpPr>
-          <p:cNvPr id="150" name="Google Shape;150;g5623285311_0_5:notes"/>
+          <p:cNvPr id="154" name="Google Shape;154;g50e882c3b4_0_5:notes"/>
           <p:cNvSpPr txBox="1"/>
           <p:nvPr>
             <p:ph idx="1" type="body"/>
@@ -1014,7 +1015,7 @@
   <p:cSld>
     <p:spTree>
       <p:nvGrpSpPr>
-        <p:cNvPr id="154" name="Shape 154"/>
+        <p:cNvPr id="158" name="Shape 158"/>
         <p:cNvGrpSpPr/>
         <p:nvPr/>
       </p:nvGrpSpPr>
@@ -1028,7 +1029,7 @@
       </p:grpSpPr>
       <p:sp>
         <p:nvSpPr>
-          <p:cNvPr id="155" name="Google Shape;155;g57be93cb49_0_0:notes"/>
+          <p:cNvPr id="159" name="Google Shape;159;g5623285311_0_5:notes"/>
           <p:cNvSpPr/>
           <p:nvPr>
             <p:ph idx="2" type="sldImg"/>
@@ -1063,7 +1064,7 @@
       </p:sp>
       <p:sp>
         <p:nvSpPr>
-          <p:cNvPr id="156" name="Google Shape;156;g57be93cb49_0_0:notes"/>
+          <p:cNvPr id="160" name="Google Shape;160;g5623285311_0_5:notes"/>
           <p:cNvSpPr txBox="1"/>
           <p:nvPr>
             <p:ph idx="1" type="body"/>
@@ -1113,7 +1114,7 @@
   <p:cSld>
     <p:spTree>
       <p:nvGrpSpPr>
-        <p:cNvPr id="160" name="Shape 160"/>
+        <p:cNvPr id="164" name="Shape 164"/>
         <p:cNvGrpSpPr/>
         <p:nvPr/>
       </p:nvGrpSpPr>
@@ -1127,7 +1128,7 @@
       </p:grpSpPr>
       <p:sp>
         <p:nvSpPr>
-          <p:cNvPr id="161" name="Google Shape;161;g50e882c3b4_0_10:notes"/>
+          <p:cNvPr id="165" name="Google Shape;165;g57be93cb49_0_0:notes"/>
           <p:cNvSpPr/>
           <p:nvPr>
             <p:ph idx="2" type="sldImg"/>
@@ -1162,7 +1163,106 @@
       </p:sp>
       <p:sp>
         <p:nvSpPr>
-          <p:cNvPr id="162" name="Google Shape;162;g50e882c3b4_0_10:notes"/>
+          <p:cNvPr id="166" name="Google Shape;166;g57be93cb49_0_0:notes"/>
+          <p:cNvSpPr txBox="1"/>
+          <p:nvPr>
+            <p:ph idx="1" type="body"/>
+          </p:nvPr>
+        </p:nvSpPr>
+        <p:spPr>
+          <a:xfrm>
+            <a:off x="685800" y="4343400"/>
+            <a:ext cx="5486400" cy="4114800"/>
+          </a:xfrm>
+          <a:prstGeom prst="rect">
+            <a:avLst/>
+          </a:prstGeom>
+        </p:spPr>
+        <p:txBody>
+          <a:bodyPr anchorCtr="0" anchor="t" bIns="91425" lIns="91425" spcFirstLastPara="1" rIns="91425" wrap="square" tIns="91425">
+            <a:noAutofit/>
+          </a:bodyPr>
+          <a:lstStyle/>
+          <a:p>
+            <a:pPr indent="0" lvl="0" marL="0" rtl="0" algn="l">
+              <a:spcBef>
+                <a:spcPts val="0"/>
+              </a:spcBef>
+              <a:spcAft>
+                <a:spcPts val="0"/>
+              </a:spcAft>
+              <a:buNone/>
+            </a:pPr>
+            <a:r>
+              <a:t/>
+            </a:r>
+            <a:endParaRPr/>
+          </a:p>
+        </p:txBody>
+      </p:sp>
+    </p:spTree>
+  </p:cSld>
+  <p:clrMapOvr>
+    <a:masterClrMapping/>
+  </p:clrMapOvr>
+</p:notes>
+</file>
+
+<file path=ppt/notesSlides/notesSlide14.xml><?xml version="1.0" encoding="utf-8"?>
+<p:notes xmlns:a="http://schemas.openxmlformats.org/drawingml/2006/main" xmlns:r="http://schemas.openxmlformats.org/officeDocument/2006/relationships" xmlns:mc="http://schemas.openxmlformats.org/markup-compatibility/2006" xmlns:mv="urn:schemas-microsoft-com:mac:vml" xmlns:p="http://schemas.openxmlformats.org/presentationml/2006/main" xmlns:c="http://schemas.openxmlformats.org/drawingml/2006/chart" xmlns:dgm="http://schemas.openxmlformats.org/drawingml/2006/diagram" xmlns:o="urn:schemas-microsoft-com:office:office" xmlns:v="urn:schemas-microsoft-com:vml" xmlns:pvml="urn:schemas-microsoft-com:office:powerpoint" xmlns:com="http://schemas.openxmlformats.org/drawingml/2006/compatibility" xmlns:p14="http://schemas.microsoft.com/office/powerpoint/2010/main" xmlns:p15="http://schemas.microsoft.com/office/powerpoint/2012/main" showMasterPhAnim="0" showMasterSp="0">
+  <p:cSld>
+    <p:spTree>
+      <p:nvGrpSpPr>
+        <p:cNvPr id="170" name="Shape 170"/>
+        <p:cNvGrpSpPr/>
+        <p:nvPr/>
+      </p:nvGrpSpPr>
+      <p:grpSpPr>
+        <a:xfrm>
+          <a:off x="0" y="0"/>
+          <a:ext cx="0" cy="0"/>
+          <a:chOff x="0" y="0"/>
+          <a:chExt cx="0" cy="0"/>
+        </a:xfrm>
+      </p:grpSpPr>
+      <p:sp>
+        <p:nvSpPr>
+          <p:cNvPr id="171" name="Google Shape;171;g50e882c3b4_0_10:notes"/>
+          <p:cNvSpPr/>
+          <p:nvPr>
+            <p:ph idx="2" type="sldImg"/>
+          </p:nvPr>
+        </p:nvSpPr>
+        <p:spPr>
+          <a:xfrm>
+            <a:off x="381300" y="685800"/>
+            <a:ext cx="6096000" cy="3429000"/>
+          </a:xfrm>
+          <a:custGeom>
+            <a:rect b="b" l="l" r="r" t="t"/>
+            <a:pathLst>
+              <a:path extrusionOk="0" h="120000" w="120000">
+                <a:moveTo>
+                  <a:pt x="0" y="0"/>
+                </a:moveTo>
+                <a:lnTo>
+                  <a:pt x="120000" y="0"/>
+                </a:lnTo>
+                <a:lnTo>
+                  <a:pt x="120000" y="120000"/>
+                </a:lnTo>
+                <a:lnTo>
+                  <a:pt x="0" y="120000"/>
+                </a:lnTo>
+                <a:close/>
+              </a:path>
+            </a:pathLst>
+          </a:custGeom>
+        </p:spPr>
+      </p:sp>
+      <p:sp>
+        <p:nvSpPr>
+          <p:cNvPr id="172" name="Google Shape;172;g50e882c3b4_0_10:notes"/>
           <p:cNvSpPr txBox="1"/>
           <p:nvPr>
             <p:ph idx="1" type="body"/>
@@ -1509,7 +1609,7 @@
   <p:cSld>
     <p:spTree>
       <p:nvGrpSpPr>
-        <p:cNvPr id="107" name="Shape 107"/>
+        <p:cNvPr id="110" name="Shape 110"/>
         <p:cNvGrpSpPr/>
         <p:nvPr/>
       </p:nvGrpSpPr>
@@ -1523,7 +1623,7 @@
       </p:grpSpPr>
       <p:sp>
         <p:nvSpPr>
-          <p:cNvPr id="108" name="Google Shape;108;g562c6556b6_0_1:notes"/>
+          <p:cNvPr id="111" name="Google Shape;111;g57f963e33c_5_0:notes"/>
           <p:cNvSpPr/>
           <p:nvPr>
             <p:ph idx="2" type="sldImg"/>
@@ -1558,7 +1658,7 @@
       </p:sp>
       <p:sp>
         <p:nvSpPr>
-          <p:cNvPr id="109" name="Google Shape;109;g562c6556b6_0_1:notes"/>
+          <p:cNvPr id="112" name="Google Shape;112;g57f963e33c_5_0:notes"/>
           <p:cNvSpPr txBox="1"/>
           <p:nvPr>
             <p:ph idx="1" type="body"/>
@@ -1608,7 +1708,7 @@
   <p:cSld>
     <p:spTree>
       <p:nvGrpSpPr>
-        <p:cNvPr id="114" name="Shape 114"/>
+        <p:cNvPr id="117" name="Shape 117"/>
         <p:cNvGrpSpPr/>
         <p:nvPr/>
       </p:nvGrpSpPr>
@@ -1622,7 +1722,7 @@
       </p:grpSpPr>
       <p:sp>
         <p:nvSpPr>
-          <p:cNvPr id="115" name="Google Shape;115;g562c6556b6_0_16:notes"/>
+          <p:cNvPr id="118" name="Google Shape;118;g562c6556b6_0_1:notes"/>
           <p:cNvSpPr/>
           <p:nvPr>
             <p:ph idx="2" type="sldImg"/>
@@ -1657,7 +1757,7 @@
       </p:sp>
       <p:sp>
         <p:nvSpPr>
-          <p:cNvPr id="116" name="Google Shape;116;g562c6556b6_0_16:notes"/>
+          <p:cNvPr id="119" name="Google Shape;119;g562c6556b6_0_1:notes"/>
           <p:cNvSpPr txBox="1"/>
           <p:nvPr>
             <p:ph idx="1" type="body"/>
@@ -1707,7 +1807,7 @@
   <p:cSld>
     <p:spTree>
       <p:nvGrpSpPr>
-        <p:cNvPr id="121" name="Shape 121"/>
+        <p:cNvPr id="124" name="Shape 124"/>
         <p:cNvGrpSpPr/>
         <p:nvPr/>
       </p:nvGrpSpPr>
@@ -1721,7 +1821,7 @@
       </p:grpSpPr>
       <p:sp>
         <p:nvSpPr>
-          <p:cNvPr id="122" name="Google Shape;122;g562c6556b6_0_8:notes"/>
+          <p:cNvPr id="125" name="Google Shape;125;g562c6556b6_0_16:notes"/>
           <p:cNvSpPr/>
           <p:nvPr>
             <p:ph idx="2" type="sldImg"/>
@@ -1756,7 +1856,7 @@
       </p:sp>
       <p:sp>
         <p:nvSpPr>
-          <p:cNvPr id="123" name="Google Shape;123;g562c6556b6_0_8:notes"/>
+          <p:cNvPr id="126" name="Google Shape;126;g562c6556b6_0_16:notes"/>
           <p:cNvSpPr txBox="1"/>
           <p:nvPr>
             <p:ph idx="1" type="body"/>
@@ -1806,7 +1906,7 @@
   <p:cSld>
     <p:spTree>
       <p:nvGrpSpPr>
-        <p:cNvPr id="128" name="Shape 128"/>
+        <p:cNvPr id="131" name="Shape 131"/>
         <p:cNvGrpSpPr/>
         <p:nvPr/>
       </p:nvGrpSpPr>
@@ -1820,7 +1920,7 @@
       </p:grpSpPr>
       <p:sp>
         <p:nvSpPr>
-          <p:cNvPr id="129" name="Google Shape;129;g562c6556b6_0_29:notes"/>
+          <p:cNvPr id="132" name="Google Shape;132;g562c6556b6_0_8:notes"/>
           <p:cNvSpPr/>
           <p:nvPr>
             <p:ph idx="2" type="sldImg"/>
@@ -1855,7 +1955,7 @@
       </p:sp>
       <p:sp>
         <p:nvSpPr>
-          <p:cNvPr id="130" name="Google Shape;130;g562c6556b6_0_29:notes"/>
+          <p:cNvPr id="133" name="Google Shape;133;g562c6556b6_0_8:notes"/>
           <p:cNvSpPr txBox="1"/>
           <p:nvPr>
             <p:ph idx="1" type="body"/>
@@ -1905,7 +2005,7 @@
   <p:cSld>
     <p:spTree>
       <p:nvGrpSpPr>
-        <p:cNvPr id="135" name="Shape 135"/>
+        <p:cNvPr id="138" name="Shape 138"/>
         <p:cNvGrpSpPr/>
         <p:nvPr/>
       </p:nvGrpSpPr>
@@ -1919,7 +2019,7 @@
       </p:grpSpPr>
       <p:sp>
         <p:nvSpPr>
-          <p:cNvPr id="136" name="Google Shape;136;g562c6556b6_0_23:notes"/>
+          <p:cNvPr id="139" name="Google Shape;139;g562c6556b6_0_29:notes"/>
           <p:cNvSpPr/>
           <p:nvPr>
             <p:ph idx="2" type="sldImg"/>
@@ -1954,7 +2054,7 @@
       </p:sp>
       <p:sp>
         <p:nvSpPr>
-          <p:cNvPr id="137" name="Google Shape;137;g562c6556b6_0_23:notes"/>
+          <p:cNvPr id="140" name="Google Shape;140;g562c6556b6_0_29:notes"/>
           <p:cNvSpPr txBox="1"/>
           <p:nvPr>
             <p:ph idx="1" type="body"/>
@@ -8680,7 +8780,7 @@
   <p:cSld>
     <p:spTree>
       <p:nvGrpSpPr>
-        <p:cNvPr id="145" name="Shape 145"/>
+        <p:cNvPr id="148" name="Shape 148"/>
         <p:cNvGrpSpPr/>
         <p:nvPr/>
       </p:nvGrpSpPr>
@@ -8694,7 +8794,7 @@
       </p:grpSpPr>
       <p:sp>
         <p:nvSpPr>
-          <p:cNvPr id="146" name="Google Shape;146;p22"/>
+          <p:cNvPr id="149" name="Google Shape;149;p22"/>
           <p:cNvSpPr txBox="1"/>
           <p:nvPr>
             <p:ph type="title"/>
@@ -8726,6 +8826,138 @@
             </a:pPr>
             <a:r>
               <a:rPr lang="en"/>
+              <a:t>Architecture: Frontend Overview</a:t>
+            </a:r>
+            <a:endParaRPr/>
+          </a:p>
+        </p:txBody>
+      </p:sp>
+      <p:sp>
+        <p:nvSpPr>
+          <p:cNvPr id="150" name="Google Shape;150;p22"/>
+          <p:cNvSpPr txBox="1"/>
+          <p:nvPr>
+            <p:ph idx="1" type="body"/>
+          </p:nvPr>
+        </p:nvSpPr>
+        <p:spPr>
+          <a:xfrm>
+            <a:off x="729450" y="2078875"/>
+            <a:ext cx="7688700" cy="2261100"/>
+          </a:xfrm>
+          <a:prstGeom prst="rect">
+            <a:avLst/>
+          </a:prstGeom>
+        </p:spPr>
+        <p:txBody>
+          <a:bodyPr anchorCtr="0" anchor="t" bIns="91425" lIns="91425" spcFirstLastPara="1" rIns="91425" wrap="square" tIns="91425">
+            <a:noAutofit/>
+          </a:bodyPr>
+          <a:lstStyle/>
+          <a:p>
+            <a:pPr indent="0" lvl="0" marL="0" rtl="0" algn="l">
+              <a:spcBef>
+                <a:spcPts val="0"/>
+              </a:spcBef>
+              <a:spcAft>
+                <a:spcPts val="1600"/>
+              </a:spcAft>
+              <a:buNone/>
+            </a:pPr>
+            <a:r>
+              <a:t/>
+            </a:r>
+            <a:endParaRPr/>
+          </a:p>
+        </p:txBody>
+      </p:sp>
+      <p:pic>
+        <p:nvPicPr>
+          <p:cNvPr id="151" name="Google Shape;151;p22"/>
+          <p:cNvPicPr preferRelativeResize="0"/>
+          <p:nvPr/>
+        </p:nvPicPr>
+        <p:blipFill>
+          <a:blip r:embed="rId3">
+            <a:alphaModFix/>
+          </a:blip>
+          <a:stretch>
+            <a:fillRect/>
+          </a:stretch>
+        </p:blipFill>
+        <p:spPr>
+          <a:xfrm>
+            <a:off x="2662225" y="2078863"/>
+            <a:ext cx="3819525" cy="2105025"/>
+          </a:xfrm>
+          <a:prstGeom prst="rect">
+            <a:avLst/>
+          </a:prstGeom>
+          <a:noFill/>
+          <a:ln>
+            <a:noFill/>
+          </a:ln>
+        </p:spPr>
+      </p:pic>
+    </p:spTree>
+  </p:cSld>
+  <p:clrMapOvr>
+    <a:masterClrMapping/>
+  </p:clrMapOvr>
+</p:sld>
+</file>
+
+<file path=ppt/slides/slide11.xml><?xml version="1.0" encoding="utf-8"?>
+<p:sld xmlns:a="http://schemas.openxmlformats.org/drawingml/2006/main" xmlns:r="http://schemas.openxmlformats.org/officeDocument/2006/relationships" xmlns:mc="http://schemas.openxmlformats.org/markup-compatibility/2006" xmlns:mv="urn:schemas-microsoft-com:mac:vml" xmlns:p="http://schemas.openxmlformats.org/presentationml/2006/main" xmlns:c="http://schemas.openxmlformats.org/drawingml/2006/chart" xmlns:dgm="http://schemas.openxmlformats.org/drawingml/2006/diagram" xmlns:o="urn:schemas-microsoft-com:office:office" xmlns:v="urn:schemas-microsoft-com:vml" xmlns:pvml="urn:schemas-microsoft-com:office:powerpoint" xmlns:com="http://schemas.openxmlformats.org/drawingml/2006/compatibility" xmlns:p14="http://schemas.microsoft.com/office/powerpoint/2010/main" xmlns:p15="http://schemas.microsoft.com/office/powerpoint/2012/main">
+  <p:cSld>
+    <p:spTree>
+      <p:nvGrpSpPr>
+        <p:cNvPr id="155" name="Shape 155"/>
+        <p:cNvGrpSpPr/>
+        <p:nvPr/>
+      </p:nvGrpSpPr>
+      <p:grpSpPr>
+        <a:xfrm>
+          <a:off x="0" y="0"/>
+          <a:ext cx="0" cy="0"/>
+          <a:chOff x="0" y="0"/>
+          <a:chExt cx="0" cy="0"/>
+        </a:xfrm>
+      </p:grpSpPr>
+      <p:sp>
+        <p:nvSpPr>
+          <p:cNvPr id="156" name="Google Shape;156;p23"/>
+          <p:cNvSpPr txBox="1"/>
+          <p:nvPr>
+            <p:ph type="title"/>
+          </p:nvPr>
+        </p:nvSpPr>
+        <p:spPr>
+          <a:xfrm>
+            <a:off x="729450" y="1318650"/>
+            <a:ext cx="7688700" cy="535200"/>
+          </a:xfrm>
+          <a:prstGeom prst="rect">
+            <a:avLst/>
+          </a:prstGeom>
+        </p:spPr>
+        <p:txBody>
+          <a:bodyPr anchorCtr="0" anchor="t" bIns="91425" lIns="91425" spcFirstLastPara="1" rIns="91425" wrap="square" tIns="91425">
+            <a:noAutofit/>
+          </a:bodyPr>
+          <a:lstStyle/>
+          <a:p>
+            <a:pPr indent="0" lvl="0" marL="0" rtl="0" algn="l">
+              <a:spcBef>
+                <a:spcPts val="0"/>
+              </a:spcBef>
+              <a:spcAft>
+                <a:spcPts val="0"/>
+              </a:spcAft>
+              <a:buNone/>
+            </a:pPr>
+            <a:r>
+              <a:rPr lang="en"/>
               <a:t>Architecture: Design Decisions</a:t>
             </a:r>
             <a:endParaRPr/>
@@ -8734,7 +8966,7 @@
       </p:sp>
       <p:sp>
         <p:nvSpPr>
-          <p:cNvPr id="147" name="Google Shape;147;p22"/>
+          <p:cNvPr id="157" name="Google Shape;157;p23"/>
           <p:cNvSpPr txBox="1"/>
           <p:nvPr>
             <p:ph idx="1" type="body"/>
@@ -8849,12 +9081,12 @@
 </p:sld>
 </file>
 
-<file path=ppt/slides/slide11.xml><?xml version="1.0" encoding="utf-8"?>
+<file path=ppt/slides/slide12.xml><?xml version="1.0" encoding="utf-8"?>
 <p:sld xmlns:a="http://schemas.openxmlformats.org/drawingml/2006/main" xmlns:r="http://schemas.openxmlformats.org/officeDocument/2006/relationships" xmlns:mc="http://schemas.openxmlformats.org/markup-compatibility/2006" xmlns:mv="urn:schemas-microsoft-com:mac:vml" xmlns:p="http://schemas.openxmlformats.org/presentationml/2006/main" xmlns:c="http://schemas.openxmlformats.org/drawingml/2006/chart" xmlns:dgm="http://schemas.openxmlformats.org/drawingml/2006/diagram" xmlns:o="urn:schemas-microsoft-com:office:office" xmlns:v="urn:schemas-microsoft-com:vml" xmlns:pvml="urn:schemas-microsoft-com:office:powerpoint" xmlns:com="http://schemas.openxmlformats.org/drawingml/2006/compatibility" xmlns:p14="http://schemas.microsoft.com/office/powerpoint/2010/main" xmlns:p15="http://schemas.microsoft.com/office/powerpoint/2012/main">
   <p:cSld>
     <p:spTree>
       <p:nvGrpSpPr>
-        <p:cNvPr id="151" name="Shape 151"/>
+        <p:cNvPr id="161" name="Shape 161"/>
         <p:cNvGrpSpPr/>
         <p:nvPr/>
       </p:nvGrpSpPr>
@@ -8868,7 +9100,7 @@
       </p:grpSpPr>
       <p:sp>
         <p:nvSpPr>
-          <p:cNvPr id="152" name="Google Shape;152;p23"/>
+          <p:cNvPr id="162" name="Google Shape;162;p24"/>
           <p:cNvSpPr txBox="1"/>
           <p:nvPr>
             <p:ph type="title"/>
@@ -8908,7 +9140,7 @@
       </p:sp>
       <p:sp>
         <p:nvSpPr>
-          <p:cNvPr id="153" name="Google Shape;153;p23"/>
+          <p:cNvPr id="163" name="Google Shape;163;p24"/>
           <p:cNvSpPr txBox="1"/>
           <p:nvPr>
             <p:ph idx="1" type="body"/>
@@ -9074,12 +9306,12 @@
 </p:sld>
 </file>
 
-<file path=ppt/slides/slide12.xml><?xml version="1.0" encoding="utf-8"?>
+<file path=ppt/slides/slide13.xml><?xml version="1.0" encoding="utf-8"?>
 <p:sld xmlns:a="http://schemas.openxmlformats.org/drawingml/2006/main" xmlns:r="http://schemas.openxmlformats.org/officeDocument/2006/relationships" xmlns:mc="http://schemas.openxmlformats.org/markup-compatibility/2006" xmlns:mv="urn:schemas-microsoft-com:mac:vml" xmlns:p="http://schemas.openxmlformats.org/presentationml/2006/main" xmlns:c="http://schemas.openxmlformats.org/drawingml/2006/chart" xmlns:dgm="http://schemas.openxmlformats.org/drawingml/2006/diagram" xmlns:o="urn:schemas-microsoft-com:office:office" xmlns:v="urn:schemas-microsoft-com:vml" xmlns:pvml="urn:schemas-microsoft-com:office:powerpoint" xmlns:com="http://schemas.openxmlformats.org/drawingml/2006/compatibility" xmlns:p14="http://schemas.microsoft.com/office/powerpoint/2010/main" xmlns:p15="http://schemas.microsoft.com/office/powerpoint/2012/main">
   <p:cSld>
     <p:spTree>
       <p:nvGrpSpPr>
-        <p:cNvPr id="157" name="Shape 157"/>
+        <p:cNvPr id="167" name="Shape 167"/>
         <p:cNvGrpSpPr/>
         <p:nvPr/>
       </p:nvGrpSpPr>
@@ -9093,7 +9325,7 @@
       </p:grpSpPr>
       <p:sp>
         <p:nvSpPr>
-          <p:cNvPr id="158" name="Google Shape;158;p24"/>
+          <p:cNvPr id="168" name="Google Shape;168;p25"/>
           <p:cNvSpPr txBox="1"/>
           <p:nvPr>
             <p:ph type="title"/>
@@ -9133,7 +9365,7 @@
       </p:sp>
       <p:sp>
         <p:nvSpPr>
-          <p:cNvPr id="159" name="Google Shape;159;p24"/>
+          <p:cNvPr id="169" name="Google Shape;169;p25"/>
           <p:cNvSpPr txBox="1"/>
           <p:nvPr>
             <p:ph idx="1" type="body"/>
@@ -9289,6 +9521,40 @@
             </a:r>
             <a:endParaRPr b="1"/>
           </a:p>
+          <a:p>
+            <a:pPr indent="-298450" lvl="1" marL="914400" rtl="0" algn="l">
+              <a:spcBef>
+                <a:spcPts val="0"/>
+              </a:spcBef>
+              <a:spcAft>
+                <a:spcPts val="0"/>
+              </a:spcAft>
+              <a:buSzPts val="1100"/>
+              <a:buChar char="○"/>
+            </a:pPr>
+            <a:r>
+              <a:rPr lang="en"/>
+              <a:t>The design of PDFBox is simple, minimalistic, and easy to use</a:t>
+            </a:r>
+            <a:endParaRPr/>
+          </a:p>
+          <a:p>
+            <a:pPr indent="-298450" lvl="1" marL="914400" rtl="0" algn="l">
+              <a:spcBef>
+                <a:spcPts val="0"/>
+              </a:spcBef>
+              <a:spcAft>
+                <a:spcPts val="0"/>
+              </a:spcAft>
+              <a:buSzPts val="1100"/>
+              <a:buChar char="○"/>
+            </a:pPr>
+            <a:r>
+              <a:rPr lang="en"/>
+              <a:t>Users should not be confused about what does what so we’ve minimized all possibility for confusion</a:t>
+            </a:r>
+            <a:endParaRPr/>
+          </a:p>
         </p:txBody>
       </p:sp>
     </p:spTree>
@@ -9299,12 +9565,12 @@
 </p:sld>
 </file>
 
-<file path=ppt/slides/slide13.xml><?xml version="1.0" encoding="utf-8"?>
+<file path=ppt/slides/slide14.xml><?xml version="1.0" encoding="utf-8"?>
 <p:sld xmlns:a="http://schemas.openxmlformats.org/drawingml/2006/main" xmlns:r="http://schemas.openxmlformats.org/officeDocument/2006/relationships" xmlns:mc="http://schemas.openxmlformats.org/markup-compatibility/2006" xmlns:mv="urn:schemas-microsoft-com:mac:vml" xmlns:p="http://schemas.openxmlformats.org/presentationml/2006/main" xmlns:c="http://schemas.openxmlformats.org/drawingml/2006/chart" xmlns:dgm="http://schemas.openxmlformats.org/drawingml/2006/diagram" xmlns:o="urn:schemas-microsoft-com:office:office" xmlns:v="urn:schemas-microsoft-com:vml" xmlns:pvml="urn:schemas-microsoft-com:office:powerpoint" xmlns:com="http://schemas.openxmlformats.org/drawingml/2006/compatibility" xmlns:p14="http://schemas.microsoft.com/office/powerpoint/2010/main" xmlns:p15="http://schemas.microsoft.com/office/powerpoint/2012/main">
   <p:cSld>
     <p:spTree>
       <p:nvGrpSpPr>
-        <p:cNvPr id="163" name="Shape 163"/>
+        <p:cNvPr id="173" name="Shape 173"/>
         <p:cNvGrpSpPr/>
         <p:nvPr/>
       </p:nvGrpSpPr>
@@ -9318,7 +9584,7 @@
       </p:grpSpPr>
       <p:sp>
         <p:nvSpPr>
-          <p:cNvPr id="164" name="Google Shape;164;p25"/>
+          <p:cNvPr id="174" name="Google Shape;174;p26"/>
           <p:cNvSpPr txBox="1"/>
           <p:nvPr>
             <p:ph type="title"/>
@@ -9358,7 +9624,7 @@
       </p:sp>
       <p:sp>
         <p:nvSpPr>
-          <p:cNvPr id="165" name="Google Shape;165;p25"/>
+          <p:cNvPr id="175" name="Google Shape;175;p26"/>
           <p:cNvSpPr txBox="1"/>
           <p:nvPr>
             <p:ph idx="1" type="body"/>
@@ -9390,10 +9656,10 @@
               <a:buChar char="●"/>
             </a:pPr>
             <a:r>
-              <a:rPr lang="en"/>
+              <a:rPr b="1" lang="en"/>
               <a:t>Measures of success:</a:t>
             </a:r>
-            <a:endParaRPr/>
+            <a:endParaRPr b="1"/>
           </a:p>
           <a:p>
             <a:pPr indent="-298450" lvl="1" marL="914400" rtl="0" algn="l">
@@ -9443,91 +9709,6 @@
             <a:r>
               <a:rPr lang="en"/>
               <a:t>Ad real estate availability and clicks per ad</a:t>
-            </a:r>
-            <a:endParaRPr/>
-          </a:p>
-          <a:p>
-            <a:pPr indent="-311150" lvl="0" marL="457200" rtl="0" algn="l">
-              <a:spcBef>
-                <a:spcPts val="0"/>
-              </a:spcBef>
-              <a:spcAft>
-                <a:spcPts val="0"/>
-              </a:spcAft>
-              <a:buSzPts val="1300"/>
-              <a:buChar char="●"/>
-            </a:pPr>
-            <a:r>
-              <a:rPr lang="en"/>
-              <a:t>Pivot time:</a:t>
-            </a:r>
-            <a:endParaRPr/>
-          </a:p>
-          <a:p>
-            <a:pPr indent="-298450" lvl="1" marL="914400" rtl="0" algn="l">
-              <a:spcBef>
-                <a:spcPts val="0"/>
-              </a:spcBef>
-              <a:spcAft>
-                <a:spcPts val="0"/>
-              </a:spcAft>
-              <a:buSzPts val="1100"/>
-              <a:buChar char="○"/>
-            </a:pPr>
-            <a:r>
-              <a:rPr lang="en"/>
-              <a:t>Unable to maintain growth strategy for 6 months</a:t>
-            </a:r>
-            <a:endParaRPr/>
-          </a:p>
-          <a:p>
-            <a:pPr indent="-298450" lvl="2" marL="1371600" rtl="0" algn="l">
-              <a:spcBef>
-                <a:spcPts val="0"/>
-              </a:spcBef>
-              <a:spcAft>
-                <a:spcPts val="0"/>
-              </a:spcAft>
-              <a:buSzPts val="1100"/>
-              <a:buChar char="■"/>
-            </a:pPr>
-            <a:r>
-              <a:rPr lang="en"/>
-              <a:t>Fold if 1 year goes by</a:t>
-            </a:r>
-            <a:endParaRPr/>
-          </a:p>
-          <a:p>
-            <a:pPr indent="-298450" lvl="1" marL="914400" rtl="0" algn="l">
-              <a:spcBef>
-                <a:spcPts val="0"/>
-              </a:spcBef>
-              <a:spcAft>
-                <a:spcPts val="0"/>
-              </a:spcAft>
-              <a:buSzPts val="1100"/>
-              <a:buChar char="○"/>
-            </a:pPr>
-            <a:r>
-              <a:rPr lang="en"/>
-              <a:t>Not profitable for 1 year, pivot</a:t>
-            </a:r>
-            <a:endParaRPr/>
-          </a:p>
-          <a:p>
-            <a:pPr indent="-298450" lvl="2" marL="1371600" rtl="0" algn="l">
-              <a:spcBef>
-                <a:spcPts val="0"/>
-              </a:spcBef>
-              <a:spcAft>
-                <a:spcPts val="0"/>
-              </a:spcAft>
-              <a:buSzPts val="1100"/>
-              <a:buChar char="■"/>
-            </a:pPr>
-            <a:r>
-              <a:rPr lang="en"/>
-              <a:t>Fold after a year and a half</a:t>
             </a:r>
             <a:endParaRPr/>
           </a:p>
@@ -9675,7 +9856,7 @@
             </a:pPr>
             <a:r>
               <a:rPr lang="en"/>
-              <a:t>Our patent pending conversion ensures quick and easy conversion of Microsoft Word, Powerpoint and Excel documents.</a:t>
+              <a:t>PDFBox provides quick and easy conversion of Microsoft Word, Powerpoint and Excel documents to PDF</a:t>
             </a:r>
             <a:endParaRPr/>
           </a:p>
@@ -9828,8 +10009,25 @@
               <a:buChar char="●"/>
             </a:pPr>
             <a:r>
+              <a:rPr b="1" lang="en" sz="1200"/>
+              <a:t>Ease of use is key:</a:t>
+            </a:r>
+            <a:endParaRPr b="1" sz="1200"/>
+          </a:p>
+          <a:p>
+            <a:pPr indent="-304800" lvl="1" marL="914400" rtl="0" algn="l">
+              <a:spcBef>
+                <a:spcPts val="0"/>
+              </a:spcBef>
+              <a:spcAft>
+                <a:spcPts val="0"/>
+              </a:spcAft>
+              <a:buSzPts val="1200"/>
+              <a:buChar char="○"/>
+            </a:pPr>
+            <a:r>
               <a:rPr lang="en" sz="1200"/>
-              <a:t>The site is designed with users in mind</a:t>
+              <a:t>We provide a method for quick and easy document conversion</a:t>
             </a:r>
             <a:endParaRPr sz="1200"/>
           </a:p>
@@ -9846,7 +10044,75 @@
             </a:pPr>
             <a:r>
               <a:rPr lang="en" sz="1200"/>
-              <a:t>Its a quick conversion</a:t>
+              <a:t>Designed with 3 clicks mentality, meaning a user can find what they are looking for within 3 clicks</a:t>
+            </a:r>
+            <a:endParaRPr sz="1200"/>
+          </a:p>
+          <a:p>
+            <a:pPr indent="-304800" lvl="0" marL="457200" rtl="0" algn="l">
+              <a:spcBef>
+                <a:spcPts val="0"/>
+              </a:spcBef>
+              <a:spcAft>
+                <a:spcPts val="0"/>
+              </a:spcAft>
+              <a:buSzPts val="1200"/>
+              <a:buChar char="●"/>
+            </a:pPr>
+            <a:r>
+              <a:rPr b="1" lang="en" sz="1200"/>
+              <a:t>Large focus on security:</a:t>
+            </a:r>
+            <a:endParaRPr b="1" sz="1200"/>
+          </a:p>
+          <a:p>
+            <a:pPr indent="-304800" lvl="1" marL="914400" rtl="0" algn="l">
+              <a:spcBef>
+                <a:spcPts val="0"/>
+              </a:spcBef>
+              <a:spcAft>
+                <a:spcPts val="0"/>
+              </a:spcAft>
+              <a:buSzPts val="1200"/>
+              <a:buChar char="○"/>
+            </a:pPr>
+            <a:r>
+              <a:rPr lang="en" sz="1200"/>
+              <a:t>We use HMAC SHA512 encryption to protect user information, as well as preserve the safety of their documents</a:t>
+            </a:r>
+            <a:endParaRPr sz="1200"/>
+          </a:p>
+          <a:p>
+            <a:pPr indent="-304800" lvl="0" marL="457200" rtl="0" algn="l">
+              <a:spcBef>
+                <a:spcPts val="0"/>
+              </a:spcBef>
+              <a:spcAft>
+                <a:spcPts val="0"/>
+              </a:spcAft>
+              <a:buSzPts val="1200"/>
+              <a:buChar char="●"/>
+            </a:pPr>
+            <a:r>
+              <a:rPr b="1" lang="en" sz="1200"/>
+              <a:t>Minimal invasiveness:</a:t>
+            </a:r>
+            <a:endParaRPr b="1" sz="1200"/>
+          </a:p>
+          <a:p>
+            <a:pPr indent="-304800" lvl="1" marL="914400" rtl="0" algn="l">
+              <a:spcBef>
+                <a:spcPts val="0"/>
+              </a:spcBef>
+              <a:spcAft>
+                <a:spcPts val="0"/>
+              </a:spcAft>
+              <a:buSzPts val="1200"/>
+              <a:buChar char="○"/>
+            </a:pPr>
+            <a:r>
+              <a:rPr lang="en" sz="1200"/>
+              <a:t>While our primary form of monetization is in the form of ads, they are designed to be minimally invasive to provide the best user experience</a:t>
             </a:r>
             <a:endParaRPr sz="1200"/>
           </a:p>
@@ -9863,75 +10129,7 @@
             </a:pPr>
             <a:r>
               <a:rPr lang="en" sz="1200"/>
-              <a:t>Site is easy to use</a:t>
-            </a:r>
-            <a:endParaRPr sz="1200"/>
-          </a:p>
-          <a:p>
-            <a:pPr indent="-304800" lvl="1" marL="914400" rtl="0" algn="l">
-              <a:spcBef>
-                <a:spcPts val="0"/>
-              </a:spcBef>
-              <a:spcAft>
-                <a:spcPts val="0"/>
-              </a:spcAft>
-              <a:buSzPts val="1200"/>
-              <a:buChar char="○"/>
-            </a:pPr>
-            <a:r>
-              <a:rPr lang="en" sz="1200"/>
-              <a:t>The site is designed with 3 clicks mentality, meaning a user can find what they are looking for within 3 clicks</a:t>
-            </a:r>
-            <a:endParaRPr sz="1200"/>
-          </a:p>
-          <a:p>
-            <a:pPr indent="-304800" lvl="1" marL="914400" rtl="0" algn="l">
-              <a:spcBef>
-                <a:spcPts val="0"/>
-              </a:spcBef>
-              <a:spcAft>
-                <a:spcPts val="0"/>
-              </a:spcAft>
-              <a:buSzPts val="1200"/>
-              <a:buChar char="○"/>
-            </a:pPr>
-            <a:r>
-              <a:rPr lang="en" sz="1200"/>
-              <a:t>Most importantly the site is SECURE</a:t>
-            </a:r>
-            <a:endParaRPr sz="1200"/>
-          </a:p>
-          <a:p>
-            <a:pPr indent="-304800" lvl="2" marL="1371600" rtl="0" algn="l">
-              <a:spcBef>
-                <a:spcPts val="0"/>
-              </a:spcBef>
-              <a:spcAft>
-                <a:spcPts val="0"/>
-              </a:spcAft>
-              <a:buSzPts val="1200"/>
-              <a:buChar char="■"/>
-            </a:pPr>
-            <a:r>
-              <a:rPr lang="en" sz="1200"/>
-              <a:t>The site uses high level encryption to protect user information as well as preserve the safety of their documents</a:t>
-            </a:r>
-            <a:endParaRPr sz="1200"/>
-          </a:p>
-          <a:p>
-            <a:pPr indent="-304800" lvl="1" marL="914400" rtl="0" algn="l">
-              <a:spcBef>
-                <a:spcPts val="0"/>
-              </a:spcBef>
-              <a:spcAft>
-                <a:spcPts val="0"/>
-              </a:spcAft>
-              <a:buSzPts val="1200"/>
-              <a:buChar char="○"/>
-            </a:pPr>
-            <a:r>
-              <a:rPr lang="en" sz="1200"/>
-              <a:t>The Site is also designed with minimally invasive ads that will not hinder the user experience. No pop ups will ever be found on the site because the user comes first</a:t>
+              <a:t>No pop-ups or intrusive ads are ever used on the site because we believe the user always comes first</a:t>
             </a:r>
             <a:endParaRPr sz="1200"/>
           </a:p>
@@ -10002,9 +10200,214 @@
           </a:p>
         </p:txBody>
       </p:sp>
+      <p:pic>
+        <p:nvPicPr>
+          <p:cNvPr descr="Image result for microsoft azure logo" id="105" name="Google Shape;105;p16"/>
+          <p:cNvPicPr preferRelativeResize="0"/>
+          <p:nvPr/>
+        </p:nvPicPr>
+        <p:blipFill>
+          <a:blip r:embed="rId3">
+            <a:alphaModFix/>
+          </a:blip>
+          <a:stretch>
+            <a:fillRect/>
+          </a:stretch>
+        </p:blipFill>
+        <p:spPr>
+          <a:xfrm>
+            <a:off x="5000275" y="3402625"/>
+            <a:ext cx="1985625" cy="1323750"/>
+          </a:xfrm>
+          <a:prstGeom prst="rect">
+            <a:avLst/>
+          </a:prstGeom>
+          <a:noFill/>
+          <a:ln>
+            <a:noFill/>
+          </a:ln>
+        </p:spPr>
+      </p:pic>
+      <p:pic>
+        <p:nvPicPr>
+          <p:cNvPr descr="Image result for asp.net logo" id="106" name="Google Shape;106;p16"/>
+          <p:cNvPicPr preferRelativeResize="0"/>
+          <p:nvPr/>
+        </p:nvPicPr>
+        <p:blipFill>
+          <a:blip r:embed="rId4">
+            <a:alphaModFix/>
+          </a:blip>
+          <a:stretch>
+            <a:fillRect/>
+          </a:stretch>
+        </p:blipFill>
+        <p:spPr>
+          <a:xfrm>
+            <a:off x="3981547" y="2037788"/>
+            <a:ext cx="1180900" cy="1180900"/>
+          </a:xfrm>
+          <a:prstGeom prst="rect">
+            <a:avLst/>
+          </a:prstGeom>
+          <a:noFill/>
+          <a:ln>
+            <a:noFill/>
+          </a:ln>
+        </p:spPr>
+      </p:pic>
+      <p:pic>
+        <p:nvPicPr>
+          <p:cNvPr descr="Image result for postgres logo" id="107" name="Google Shape;107;p16"/>
+          <p:cNvPicPr preferRelativeResize="0"/>
+          <p:nvPr/>
+        </p:nvPicPr>
+        <p:blipFill>
+          <a:blip r:embed="rId5">
+            <a:alphaModFix/>
+          </a:blip>
+          <a:stretch>
+            <a:fillRect/>
+          </a:stretch>
+        </p:blipFill>
+        <p:spPr>
+          <a:xfrm>
+            <a:off x="1377825" y="2075575"/>
+            <a:ext cx="1790775" cy="1105313"/>
+          </a:xfrm>
+          <a:prstGeom prst="rect">
+            <a:avLst/>
+          </a:prstGeom>
+          <a:noFill/>
+          <a:ln>
+            <a:noFill/>
+          </a:ln>
+        </p:spPr>
+      </p:pic>
+      <p:pic>
+        <p:nvPicPr>
+          <p:cNvPr descr="Image result for bootstrap logo" id="108" name="Google Shape;108;p16"/>
+          <p:cNvPicPr preferRelativeResize="0"/>
+          <p:nvPr/>
+        </p:nvPicPr>
+        <p:blipFill>
+          <a:blip r:embed="rId6">
+            <a:alphaModFix/>
+          </a:blip>
+          <a:stretch>
+            <a:fillRect/>
+          </a:stretch>
+        </p:blipFill>
+        <p:spPr>
+          <a:xfrm>
+            <a:off x="2390500" y="3402625"/>
+            <a:ext cx="1591046" cy="1323750"/>
+          </a:xfrm>
+          <a:prstGeom prst="rect">
+            <a:avLst/>
+          </a:prstGeom>
+          <a:noFill/>
+          <a:ln>
+            <a:noFill/>
+          </a:ln>
+        </p:spPr>
+      </p:pic>
+      <p:pic>
+        <p:nvPicPr>
+          <p:cNvPr descr="Image result for angular logo" id="109" name="Google Shape;109;p16"/>
+          <p:cNvPicPr preferRelativeResize="0"/>
+          <p:nvPr/>
+        </p:nvPicPr>
+        <p:blipFill>
+          <a:blip r:embed="rId7">
+            <a:alphaModFix/>
+          </a:blip>
+          <a:stretch>
+            <a:fillRect/>
+          </a:stretch>
+        </p:blipFill>
+        <p:spPr>
+          <a:xfrm>
+            <a:off x="5975400" y="2066502"/>
+            <a:ext cx="1010500" cy="1010500"/>
+          </a:xfrm>
+          <a:prstGeom prst="rect">
+            <a:avLst/>
+          </a:prstGeom>
+          <a:noFill/>
+          <a:ln>
+            <a:noFill/>
+          </a:ln>
+        </p:spPr>
+      </p:pic>
+    </p:spTree>
+  </p:cSld>
+  <p:clrMapOvr>
+    <a:masterClrMapping/>
+  </p:clrMapOvr>
+</p:sld>
+</file>
+
+<file path=ppt/slides/slide5.xml><?xml version="1.0" encoding="utf-8"?>
+<p:sld xmlns:a="http://schemas.openxmlformats.org/drawingml/2006/main" xmlns:r="http://schemas.openxmlformats.org/officeDocument/2006/relationships" xmlns:mc="http://schemas.openxmlformats.org/markup-compatibility/2006" xmlns:mv="urn:schemas-microsoft-com:mac:vml" xmlns:p="http://schemas.openxmlformats.org/presentationml/2006/main" xmlns:c="http://schemas.openxmlformats.org/drawingml/2006/chart" xmlns:dgm="http://schemas.openxmlformats.org/drawingml/2006/diagram" xmlns:o="urn:schemas-microsoft-com:office:office" xmlns:v="urn:schemas-microsoft-com:vml" xmlns:pvml="urn:schemas-microsoft-com:office:powerpoint" xmlns:com="http://schemas.openxmlformats.org/drawingml/2006/compatibility" xmlns:p14="http://schemas.microsoft.com/office/powerpoint/2010/main" xmlns:p15="http://schemas.microsoft.com/office/powerpoint/2012/main">
+  <p:cSld>
+    <p:spTree>
+      <p:nvGrpSpPr>
+        <p:cNvPr id="113" name="Shape 113"/>
+        <p:cNvGrpSpPr/>
+        <p:nvPr/>
+      </p:nvGrpSpPr>
+      <p:grpSpPr>
+        <a:xfrm>
+          <a:off x="0" y="0"/>
+          <a:ext cx="0" cy="0"/>
+          <a:chOff x="0" y="0"/>
+          <a:chExt cx="0" cy="0"/>
+        </a:xfrm>
+      </p:grpSpPr>
       <p:sp>
         <p:nvSpPr>
-          <p:cNvPr id="105" name="Google Shape;105;p16"/>
+          <p:cNvPr id="114" name="Google Shape;114;p17"/>
+          <p:cNvSpPr txBox="1"/>
+          <p:nvPr>
+            <p:ph type="title"/>
+          </p:nvPr>
+        </p:nvSpPr>
+        <p:spPr>
+          <a:xfrm>
+            <a:off x="729450" y="1318650"/>
+            <a:ext cx="7688700" cy="535200"/>
+          </a:xfrm>
+          <a:prstGeom prst="rect">
+            <a:avLst/>
+          </a:prstGeom>
+        </p:spPr>
+        <p:txBody>
+          <a:bodyPr anchorCtr="0" anchor="t" bIns="91425" lIns="91425" spcFirstLastPara="1" rIns="91425" wrap="square" tIns="91425">
+            <a:noAutofit/>
+          </a:bodyPr>
+          <a:lstStyle/>
+          <a:p>
+            <a:pPr indent="0" lvl="0" marL="0" rtl="0" algn="l">
+              <a:spcBef>
+                <a:spcPts val="0"/>
+              </a:spcBef>
+              <a:spcAft>
+                <a:spcPts val="0"/>
+              </a:spcAft>
+              <a:buNone/>
+            </a:pPr>
+            <a:r>
+              <a:rPr lang="en"/>
+              <a:t>Architecture: Overview</a:t>
+            </a:r>
+            <a:endParaRPr/>
+          </a:p>
+        </p:txBody>
+      </p:sp>
+      <p:sp>
+        <p:nvSpPr>
+          <p:cNvPr id="115" name="Google Shape;115;p17"/>
           <p:cNvSpPr txBox="1"/>
           <p:nvPr>
             <p:ph idx="1" type="body"/>
@@ -10043,7 +10446,7 @@
       </p:sp>
       <p:pic>
         <p:nvPicPr>
-          <p:cNvPr id="106" name="Google Shape;106;p16"/>
+          <p:cNvPr id="116" name="Google Shape;116;p17"/>
           <p:cNvPicPr preferRelativeResize="0"/>
           <p:nvPr/>
         </p:nvPicPr>
@@ -10077,12 +10480,12 @@
 </p:sld>
 </file>
 
-<file path=ppt/slides/slide5.xml><?xml version="1.0" encoding="utf-8"?>
+<file path=ppt/slides/slide6.xml><?xml version="1.0" encoding="utf-8"?>
 <p:sld xmlns:a="http://schemas.openxmlformats.org/drawingml/2006/main" xmlns:r="http://schemas.openxmlformats.org/officeDocument/2006/relationships" xmlns:mc="http://schemas.openxmlformats.org/markup-compatibility/2006" xmlns:mv="urn:schemas-microsoft-com:mac:vml" xmlns:p="http://schemas.openxmlformats.org/presentationml/2006/main" xmlns:c="http://schemas.openxmlformats.org/drawingml/2006/chart" xmlns:dgm="http://schemas.openxmlformats.org/drawingml/2006/diagram" xmlns:o="urn:schemas-microsoft-com:office:office" xmlns:v="urn:schemas-microsoft-com:vml" xmlns:pvml="urn:schemas-microsoft-com:office:powerpoint" xmlns:com="http://schemas.openxmlformats.org/drawingml/2006/compatibility" xmlns:p14="http://schemas.microsoft.com/office/powerpoint/2010/main" xmlns:p15="http://schemas.microsoft.com/office/powerpoint/2012/main">
   <p:cSld>
     <p:spTree>
       <p:nvGrpSpPr>
-        <p:cNvPr id="110" name="Shape 110"/>
+        <p:cNvPr id="120" name="Shape 120"/>
         <p:cNvGrpSpPr/>
         <p:nvPr/>
       </p:nvGrpSpPr>
@@ -10096,7 +10499,7 @@
       </p:grpSpPr>
       <p:sp>
         <p:nvSpPr>
-          <p:cNvPr id="111" name="Google Shape;111;p17"/>
+          <p:cNvPr id="121" name="Google Shape;121;p18"/>
           <p:cNvSpPr txBox="1"/>
           <p:nvPr>
             <p:ph type="title"/>
@@ -10136,7 +10539,7 @@
       </p:sp>
       <p:sp>
         <p:nvSpPr>
-          <p:cNvPr id="112" name="Google Shape;112;p17"/>
+          <p:cNvPr id="122" name="Google Shape;122;p18"/>
           <p:cNvSpPr txBox="1"/>
           <p:nvPr>
             <p:ph idx="1" type="body"/>
@@ -10175,7 +10578,7 @@
       </p:sp>
       <p:pic>
         <p:nvPicPr>
-          <p:cNvPr id="113" name="Google Shape;113;p17"/>
+          <p:cNvPr id="123" name="Google Shape;123;p18"/>
           <p:cNvPicPr preferRelativeResize="0"/>
           <p:nvPr/>
         </p:nvPicPr>
@@ -10209,12 +10612,12 @@
 </p:sld>
 </file>
 
-<file path=ppt/slides/slide6.xml><?xml version="1.0" encoding="utf-8"?>
+<file path=ppt/slides/slide7.xml><?xml version="1.0" encoding="utf-8"?>
 <p:sld xmlns:a="http://schemas.openxmlformats.org/drawingml/2006/main" xmlns:r="http://schemas.openxmlformats.org/officeDocument/2006/relationships" xmlns:mc="http://schemas.openxmlformats.org/markup-compatibility/2006" xmlns:mv="urn:schemas-microsoft-com:mac:vml" xmlns:p="http://schemas.openxmlformats.org/presentationml/2006/main" xmlns:c="http://schemas.openxmlformats.org/drawingml/2006/chart" xmlns:dgm="http://schemas.openxmlformats.org/drawingml/2006/diagram" xmlns:o="urn:schemas-microsoft-com:office:office" xmlns:v="urn:schemas-microsoft-com:vml" xmlns:pvml="urn:schemas-microsoft-com:office:powerpoint" xmlns:com="http://schemas.openxmlformats.org/drawingml/2006/compatibility" xmlns:p14="http://schemas.microsoft.com/office/powerpoint/2010/main" xmlns:p15="http://schemas.microsoft.com/office/powerpoint/2012/main">
   <p:cSld>
     <p:spTree>
       <p:nvGrpSpPr>
-        <p:cNvPr id="117" name="Shape 117"/>
+        <p:cNvPr id="127" name="Shape 127"/>
         <p:cNvGrpSpPr/>
         <p:nvPr/>
       </p:nvGrpSpPr>
@@ -10228,7 +10631,7 @@
       </p:grpSpPr>
       <p:sp>
         <p:nvSpPr>
-          <p:cNvPr id="118" name="Google Shape;118;p18"/>
+          <p:cNvPr id="128" name="Google Shape;128;p19"/>
           <p:cNvSpPr txBox="1"/>
           <p:nvPr>
             <p:ph type="title"/>
@@ -10268,7 +10671,7 @@
       </p:sp>
       <p:sp>
         <p:nvSpPr>
-          <p:cNvPr id="119" name="Google Shape;119;p18"/>
+          <p:cNvPr id="129" name="Google Shape;129;p19"/>
           <p:cNvSpPr txBox="1"/>
           <p:nvPr>
             <p:ph idx="1" type="body"/>
@@ -10307,7 +10710,7 @@
       </p:sp>
       <p:pic>
         <p:nvPicPr>
-          <p:cNvPr id="120" name="Google Shape;120;p18"/>
+          <p:cNvPr id="130" name="Google Shape;130;p19"/>
           <p:cNvPicPr preferRelativeResize="0"/>
           <p:nvPr/>
         </p:nvPicPr>
@@ -10341,12 +10744,12 @@
 </p:sld>
 </file>
 
-<file path=ppt/slides/slide7.xml><?xml version="1.0" encoding="utf-8"?>
+<file path=ppt/slides/slide8.xml><?xml version="1.0" encoding="utf-8"?>
 <p:sld xmlns:a="http://schemas.openxmlformats.org/drawingml/2006/main" xmlns:r="http://schemas.openxmlformats.org/officeDocument/2006/relationships" xmlns:mc="http://schemas.openxmlformats.org/markup-compatibility/2006" xmlns:mv="urn:schemas-microsoft-com:mac:vml" xmlns:p="http://schemas.openxmlformats.org/presentationml/2006/main" xmlns:c="http://schemas.openxmlformats.org/drawingml/2006/chart" xmlns:dgm="http://schemas.openxmlformats.org/drawingml/2006/diagram" xmlns:o="urn:schemas-microsoft-com:office:office" xmlns:v="urn:schemas-microsoft-com:vml" xmlns:pvml="urn:schemas-microsoft-com:office:powerpoint" xmlns:com="http://schemas.openxmlformats.org/drawingml/2006/compatibility" xmlns:p14="http://schemas.microsoft.com/office/powerpoint/2010/main" xmlns:p15="http://schemas.microsoft.com/office/powerpoint/2012/main">
   <p:cSld>
     <p:spTree>
       <p:nvGrpSpPr>
-        <p:cNvPr id="124" name="Shape 124"/>
+        <p:cNvPr id="134" name="Shape 134"/>
         <p:cNvGrpSpPr/>
         <p:nvPr/>
       </p:nvGrpSpPr>
@@ -10360,7 +10763,7 @@
       </p:grpSpPr>
       <p:sp>
         <p:nvSpPr>
-          <p:cNvPr id="125" name="Google Shape;125;p19"/>
+          <p:cNvPr id="135" name="Google Shape;135;p20"/>
           <p:cNvSpPr txBox="1"/>
           <p:nvPr>
             <p:ph type="title"/>
@@ -10400,7 +10803,7 @@
       </p:sp>
       <p:sp>
         <p:nvSpPr>
-          <p:cNvPr id="126" name="Google Shape;126;p19"/>
+          <p:cNvPr id="136" name="Google Shape;136;p20"/>
           <p:cNvSpPr txBox="1"/>
           <p:nvPr>
             <p:ph idx="1" type="body"/>
@@ -10439,139 +10842,7 @@
       </p:sp>
       <p:pic>
         <p:nvPicPr>
-          <p:cNvPr id="127" name="Google Shape;127;p19"/>
-          <p:cNvPicPr preferRelativeResize="0"/>
-          <p:nvPr/>
-        </p:nvPicPr>
-        <p:blipFill>
-          <a:blip r:embed="rId3">
-            <a:alphaModFix/>
-          </a:blip>
-          <a:stretch>
-            <a:fillRect/>
-          </a:stretch>
-        </p:blipFill>
-        <p:spPr>
-          <a:xfrm>
-            <a:off x="2283025" y="2078863"/>
-            <a:ext cx="4581525" cy="2676525"/>
-          </a:xfrm>
-          <a:prstGeom prst="rect">
-            <a:avLst/>
-          </a:prstGeom>
-          <a:noFill/>
-          <a:ln>
-            <a:noFill/>
-          </a:ln>
-        </p:spPr>
-      </p:pic>
-    </p:spTree>
-  </p:cSld>
-  <p:clrMapOvr>
-    <a:masterClrMapping/>
-  </p:clrMapOvr>
-</p:sld>
-</file>
-
-<file path=ppt/slides/slide8.xml><?xml version="1.0" encoding="utf-8"?>
-<p:sld xmlns:a="http://schemas.openxmlformats.org/drawingml/2006/main" xmlns:r="http://schemas.openxmlformats.org/officeDocument/2006/relationships" xmlns:mc="http://schemas.openxmlformats.org/markup-compatibility/2006" xmlns:mv="urn:schemas-microsoft-com:mac:vml" xmlns:p="http://schemas.openxmlformats.org/presentationml/2006/main" xmlns:c="http://schemas.openxmlformats.org/drawingml/2006/chart" xmlns:dgm="http://schemas.openxmlformats.org/drawingml/2006/diagram" xmlns:o="urn:schemas-microsoft-com:office:office" xmlns:v="urn:schemas-microsoft-com:vml" xmlns:pvml="urn:schemas-microsoft-com:office:powerpoint" xmlns:com="http://schemas.openxmlformats.org/drawingml/2006/compatibility" xmlns:p14="http://schemas.microsoft.com/office/powerpoint/2010/main" xmlns:p15="http://schemas.microsoft.com/office/powerpoint/2012/main">
-  <p:cSld>
-    <p:spTree>
-      <p:nvGrpSpPr>
-        <p:cNvPr id="131" name="Shape 131"/>
-        <p:cNvGrpSpPr/>
-        <p:nvPr/>
-      </p:nvGrpSpPr>
-      <p:grpSpPr>
-        <a:xfrm>
-          <a:off x="0" y="0"/>
-          <a:ext cx="0" cy="0"/>
-          <a:chOff x="0" y="0"/>
-          <a:chExt cx="0" cy="0"/>
-        </a:xfrm>
-      </p:grpSpPr>
-      <p:sp>
-        <p:nvSpPr>
-          <p:cNvPr id="132" name="Google Shape;132;p20"/>
-          <p:cNvSpPr txBox="1"/>
-          <p:nvPr>
-            <p:ph type="title"/>
-          </p:nvPr>
-        </p:nvSpPr>
-        <p:spPr>
-          <a:xfrm>
-            <a:off x="729450" y="1318650"/>
-            <a:ext cx="7688700" cy="535200"/>
-          </a:xfrm>
-          <a:prstGeom prst="rect">
-            <a:avLst/>
-          </a:prstGeom>
-        </p:spPr>
-        <p:txBody>
-          <a:bodyPr anchorCtr="0" anchor="t" bIns="91425" lIns="91425" spcFirstLastPara="1" rIns="91425" wrap="square" tIns="91425">
-            <a:noAutofit/>
-          </a:bodyPr>
-          <a:lstStyle/>
-          <a:p>
-            <a:pPr indent="0" lvl="0" marL="0" rtl="0" algn="l">
-              <a:spcBef>
-                <a:spcPts val="0"/>
-              </a:spcBef>
-              <a:spcAft>
-                <a:spcPts val="0"/>
-              </a:spcAft>
-              <a:buNone/>
-            </a:pPr>
-            <a:r>
-              <a:rPr lang="en"/>
-              <a:t>Architecture: Frontend Overview</a:t>
-            </a:r>
-            <a:endParaRPr/>
-          </a:p>
-        </p:txBody>
-      </p:sp>
-      <p:sp>
-        <p:nvSpPr>
-          <p:cNvPr id="133" name="Google Shape;133;p20"/>
-          <p:cNvSpPr txBox="1"/>
-          <p:nvPr>
-            <p:ph idx="1" type="body"/>
-          </p:nvPr>
-        </p:nvSpPr>
-        <p:spPr>
-          <a:xfrm>
-            <a:off x="729450" y="2078875"/>
-            <a:ext cx="7688700" cy="2261100"/>
-          </a:xfrm>
-          <a:prstGeom prst="rect">
-            <a:avLst/>
-          </a:prstGeom>
-        </p:spPr>
-        <p:txBody>
-          <a:bodyPr anchorCtr="0" anchor="t" bIns="91425" lIns="91425" spcFirstLastPara="1" rIns="91425" wrap="square" tIns="91425">
-            <a:noAutofit/>
-          </a:bodyPr>
-          <a:lstStyle/>
-          <a:p>
-            <a:pPr indent="0" lvl="0" marL="0" rtl="0" algn="l">
-              <a:spcBef>
-                <a:spcPts val="0"/>
-              </a:spcBef>
-              <a:spcAft>
-                <a:spcPts val="1600"/>
-              </a:spcAft>
-              <a:buNone/>
-            </a:pPr>
-            <a:r>
-              <a:t/>
-            </a:r>
-            <a:endParaRPr/>
-          </a:p>
-        </p:txBody>
-      </p:sp>
-      <p:pic>
-        <p:nvPicPr>
-          <p:cNvPr id="134" name="Google Shape;134;p20"/>
+          <p:cNvPr id="137" name="Google Shape;137;p20"/>
           <p:cNvPicPr preferRelativeResize="0"/>
           <p:nvPr/>
         </p:nvPicPr>
@@ -10610,7 +10881,7 @@
   <p:cSld>
     <p:spTree>
       <p:nvGrpSpPr>
-        <p:cNvPr id="138" name="Shape 138"/>
+        <p:cNvPr id="141" name="Shape 141"/>
         <p:cNvGrpSpPr/>
         <p:nvPr/>
       </p:nvGrpSpPr>
@@ -10624,7 +10895,7 @@
       </p:grpSpPr>
       <p:sp>
         <p:nvSpPr>
-          <p:cNvPr id="139" name="Google Shape;139;p21"/>
+          <p:cNvPr id="142" name="Google Shape;142;p21"/>
           <p:cNvSpPr txBox="1"/>
           <p:nvPr>
             <p:ph type="title"/>
@@ -10664,7 +10935,7 @@
       </p:sp>
       <p:sp>
         <p:nvSpPr>
-          <p:cNvPr id="140" name="Google Shape;140;p21"/>
+          <p:cNvPr id="143" name="Google Shape;143;p21"/>
           <p:cNvSpPr txBox="1"/>
           <p:nvPr>
             <p:ph idx="1" type="body"/>
@@ -10703,7 +10974,7 @@
       </p:sp>
       <p:pic>
         <p:nvPicPr>
-          <p:cNvPr id="141" name="Google Shape;141;p21"/>
+          <p:cNvPr id="144" name="Google Shape;144;p21"/>
           <p:cNvPicPr preferRelativeResize="0"/>
           <p:nvPr/>
         </p:nvPicPr>
@@ -10717,8 +10988,8 @@
         </p:blipFill>
         <p:spPr>
           <a:xfrm>
-            <a:off x="2662225" y="2078863"/>
-            <a:ext cx="3819525" cy="2105025"/>
+            <a:off x="2283025" y="2078863"/>
+            <a:ext cx="4581525" cy="2676525"/>
           </a:xfrm>
           <a:prstGeom prst="rect">
             <a:avLst/>

</xml_diff>